<commit_message>
Added pitch 2 update (Without videos)
</commit_message>
<xml_diff>
--- a/Project Management/Pitches/Pitch 2.pptx
+++ b/Project Management/Pitches/Pitch 2.pptx
@@ -5,27 +5,28 @@
     <p:sldMasterId id="2147483660" r:id="rId1"/>
   </p:sldMasterIdLst>
   <p:notesMasterIdLst>
-    <p:notesMasterId r:id="rId20"/>
+    <p:notesMasterId r:id="rId21"/>
   </p:notesMasterIdLst>
   <p:sldIdLst>
     <p:sldId id="256" r:id="rId2"/>
     <p:sldId id="257" r:id="rId3"/>
-    <p:sldId id="259" r:id="rId4"/>
-    <p:sldId id="258" r:id="rId5"/>
-    <p:sldId id="271" r:id="rId6"/>
-    <p:sldId id="272" r:id="rId7"/>
-    <p:sldId id="273" r:id="rId8"/>
-    <p:sldId id="274" r:id="rId9"/>
-    <p:sldId id="275" r:id="rId10"/>
-    <p:sldId id="267" r:id="rId11"/>
-    <p:sldId id="268" r:id="rId12"/>
-    <p:sldId id="269" r:id="rId13"/>
-    <p:sldId id="270" r:id="rId14"/>
-    <p:sldId id="261" r:id="rId15"/>
-    <p:sldId id="266" r:id="rId16"/>
-    <p:sldId id="264" r:id="rId17"/>
-    <p:sldId id="263" r:id="rId18"/>
-    <p:sldId id="265" r:id="rId19"/>
+    <p:sldId id="258" r:id="rId4"/>
+    <p:sldId id="259" r:id="rId5"/>
+    <p:sldId id="260" r:id="rId6"/>
+    <p:sldId id="261" r:id="rId7"/>
+    <p:sldId id="262" r:id="rId8"/>
+    <p:sldId id="263" r:id="rId9"/>
+    <p:sldId id="264" r:id="rId10"/>
+    <p:sldId id="265" r:id="rId11"/>
+    <p:sldId id="266" r:id="rId12"/>
+    <p:sldId id="267" r:id="rId13"/>
+    <p:sldId id="268" r:id="rId14"/>
+    <p:sldId id="269" r:id="rId15"/>
+    <p:sldId id="270" r:id="rId16"/>
+    <p:sldId id="271" r:id="rId17"/>
+    <p:sldId id="272" r:id="rId18"/>
+    <p:sldId id="273" r:id="rId19"/>
+    <p:sldId id="274" r:id="rId20"/>
   </p:sldIdLst>
   <p:sldSz cx="12192000" cy="6858000"/>
   <p:notesSz cx="6858000" cy="9144000"/>
@@ -214,7 +215,7 @@
           <a:p>
             <a:fld id="{58419CCB-2BA3-4560-B880-BE25D0AD66BC}" type="datetimeFigureOut">
               <a:rPr lang="en-GB" smtClean="0"/>
-              <a:t>13/11/2016</a:t>
+              <a:t>16/11/2016</a:t>
             </a:fld>
             <a:endParaRPr lang="en-GB"/>
           </a:p>
@@ -547,7 +548,7 @@
           <a:p>
             <a:fld id="{F1254CC7-1D46-4721-951A-56A46FE3B6EA}" type="slidenum">
               <a:rPr lang="en-US"/>
-              <a:t>15</a:t>
+              <a:t>16</a:t>
             </a:fld>
             <a:endParaRPr lang="en-US"/>
           </a:p>
@@ -556,7 +557,7 @@
     </p:spTree>
     <p:extLst>
       <p:ext uri="{BB962C8B-B14F-4D97-AF65-F5344CB8AC3E}">
-        <p14:creationId xmlns:p14="http://schemas.microsoft.com/office/powerpoint/2010/main" val="3171640612"/>
+        <p14:creationId xmlns:p14="http://schemas.microsoft.com/office/powerpoint/2010/main" val="4127944983"/>
       </p:ext>
     </p:extLst>
   </p:cSld>
@@ -1288,7 +1289,7 @@
           <a:p>
             <a:fld id="{52E35EFA-6DBE-4BCA-B404-F185A1FAAF3C}" type="datetimeFigureOut">
               <a:rPr lang="en-GB" smtClean="0"/>
-              <a:t>13/11/2016</a:t>
+              <a:t>16/11/2016</a:t>
             </a:fld>
             <a:endParaRPr lang="en-GB"/>
           </a:p>
@@ -1539,7 +1540,7 @@
           <a:p>
             <a:fld id="{52E35EFA-6DBE-4BCA-B404-F185A1FAAF3C}" type="datetimeFigureOut">
               <a:rPr lang="en-GB" smtClean="0"/>
-              <a:t>13/11/2016</a:t>
+              <a:t>16/11/2016</a:t>
             </a:fld>
             <a:endParaRPr lang="en-GB"/>
           </a:p>
@@ -1853,7 +1854,7 @@
           <a:p>
             <a:fld id="{52E35EFA-6DBE-4BCA-B404-F185A1FAAF3C}" type="datetimeFigureOut">
               <a:rPr lang="en-GB" smtClean="0"/>
-              <a:t>13/11/2016</a:t>
+              <a:t>16/11/2016</a:t>
             </a:fld>
             <a:endParaRPr lang="en-GB"/>
           </a:p>
@@ -2194,7 +2195,7 @@
           <a:p>
             <a:fld id="{52E35EFA-6DBE-4BCA-B404-F185A1FAAF3C}" type="datetimeFigureOut">
               <a:rPr lang="en-GB" smtClean="0"/>
-              <a:t>13/11/2016</a:t>
+              <a:t>16/11/2016</a:t>
             </a:fld>
             <a:endParaRPr lang="en-GB"/>
           </a:p>
@@ -2508,7 +2509,7 @@
           <a:p>
             <a:fld id="{52E35EFA-6DBE-4BCA-B404-F185A1FAAF3C}" type="datetimeFigureOut">
               <a:rPr lang="en-GB" smtClean="0"/>
-              <a:t>13/11/2016</a:t>
+              <a:t>16/11/2016</a:t>
             </a:fld>
             <a:endParaRPr lang="en-GB"/>
           </a:p>
@@ -2901,7 +2902,7 @@
           <a:p>
             <a:fld id="{52E35EFA-6DBE-4BCA-B404-F185A1FAAF3C}" type="datetimeFigureOut">
               <a:rPr lang="en-GB" smtClean="0"/>
-              <a:t>13/11/2016</a:t>
+              <a:t>16/11/2016</a:t>
             </a:fld>
             <a:endParaRPr lang="en-GB"/>
           </a:p>
@@ -3071,7 +3072,7 @@
           <a:p>
             <a:fld id="{52E35EFA-6DBE-4BCA-B404-F185A1FAAF3C}" type="datetimeFigureOut">
               <a:rPr lang="en-GB" smtClean="0"/>
-              <a:t>13/11/2016</a:t>
+              <a:t>16/11/2016</a:t>
             </a:fld>
             <a:endParaRPr lang="en-GB"/>
           </a:p>
@@ -3251,7 +3252,7 @@
           <a:p>
             <a:fld id="{52E35EFA-6DBE-4BCA-B404-F185A1FAAF3C}" type="datetimeFigureOut">
               <a:rPr lang="en-GB" smtClean="0"/>
-              <a:t>13/11/2016</a:t>
+              <a:t>16/11/2016</a:t>
             </a:fld>
             <a:endParaRPr lang="en-GB"/>
           </a:p>
@@ -3427,7 +3428,7 @@
           <a:p>
             <a:fld id="{52E35EFA-6DBE-4BCA-B404-F185A1FAAF3C}" type="datetimeFigureOut">
               <a:rPr lang="en-GB" smtClean="0"/>
-              <a:t>13/11/2016</a:t>
+              <a:t>16/11/2016</a:t>
             </a:fld>
             <a:endParaRPr lang="en-GB"/>
           </a:p>
@@ -3674,7 +3675,7 @@
           <a:p>
             <a:fld id="{52E35EFA-6DBE-4BCA-B404-F185A1FAAF3C}" type="datetimeFigureOut">
               <a:rPr lang="en-GB" smtClean="0"/>
-              <a:t>13/11/2016</a:t>
+              <a:t>16/11/2016</a:t>
             </a:fld>
             <a:endParaRPr lang="en-GB"/>
           </a:p>
@@ -3906,7 +3907,7 @@
           <a:p>
             <a:fld id="{52E35EFA-6DBE-4BCA-B404-F185A1FAAF3C}" type="datetimeFigureOut">
               <a:rPr lang="en-GB" smtClean="0"/>
-              <a:t>13/11/2016</a:t>
+              <a:t>16/11/2016</a:t>
             </a:fld>
             <a:endParaRPr lang="en-GB"/>
           </a:p>
@@ -4280,7 +4281,7 @@
           <a:p>
             <a:fld id="{52E35EFA-6DBE-4BCA-B404-F185A1FAAF3C}" type="datetimeFigureOut">
               <a:rPr lang="en-GB" smtClean="0"/>
-              <a:t>13/11/2016</a:t>
+              <a:t>16/11/2016</a:t>
             </a:fld>
             <a:endParaRPr lang="en-GB"/>
           </a:p>
@@ -4403,7 +4404,7 @@
           <a:p>
             <a:fld id="{52E35EFA-6DBE-4BCA-B404-F185A1FAAF3C}" type="datetimeFigureOut">
               <a:rPr lang="en-GB" smtClean="0"/>
-              <a:t>13/11/2016</a:t>
+              <a:t>16/11/2016</a:t>
             </a:fld>
             <a:endParaRPr lang="en-GB"/>
           </a:p>
@@ -4498,7 +4499,7 @@
           <a:p>
             <a:fld id="{52E35EFA-6DBE-4BCA-B404-F185A1FAAF3C}" type="datetimeFigureOut">
               <a:rPr lang="en-GB" smtClean="0"/>
-              <a:t>13/11/2016</a:t>
+              <a:t>16/11/2016</a:t>
             </a:fld>
             <a:endParaRPr lang="en-GB"/>
           </a:p>
@@ -4753,7 +4754,7 @@
           <a:p>
             <a:fld id="{52E35EFA-6DBE-4BCA-B404-F185A1FAAF3C}" type="datetimeFigureOut">
               <a:rPr lang="en-GB" smtClean="0"/>
-              <a:t>13/11/2016</a:t>
+              <a:t>16/11/2016</a:t>
             </a:fld>
             <a:endParaRPr lang="en-GB"/>
           </a:p>
@@ -5016,7 +5017,7 @@
           <a:p>
             <a:fld id="{52E35EFA-6DBE-4BCA-B404-F185A1FAAF3C}" type="datetimeFigureOut">
               <a:rPr lang="en-GB" smtClean="0"/>
-              <a:t>13/11/2016</a:t>
+              <a:t>16/11/2016</a:t>
             </a:fld>
             <a:endParaRPr lang="en-GB"/>
           </a:p>
@@ -5759,7 +5760,7 @@
           <a:p>
             <a:fld id="{52E35EFA-6DBE-4BCA-B404-F185A1FAAF3C}" type="datetimeFigureOut">
               <a:rPr lang="en-GB" smtClean="0"/>
-              <a:t>13/11/2016</a:t>
+              <a:t>16/11/2016</a:t>
             </a:fld>
             <a:endParaRPr lang="en-GB"/>
           </a:p>
@@ -6330,7 +6331,7 @@
     </p:spTree>
     <p:extLst>
       <p:ext uri="{BB962C8B-B14F-4D97-AF65-F5344CB8AC3E}">
-        <p14:creationId xmlns:p14="http://schemas.microsoft.com/office/powerpoint/2010/main" val="2780363647"/>
+        <p14:creationId xmlns:p14="http://schemas.microsoft.com/office/powerpoint/2010/main" val="3716037020"/>
       </p:ext>
     </p:extLst>
   </p:cSld>
@@ -6374,7 +6375,7 @@
           <a:p>
             <a:r>
               <a:rPr lang="en-GB" dirty="0"/>
-              <a:t>Rewards</a:t>
+              <a:t>Social Competition</a:t>
             </a:r>
           </a:p>
         </p:txBody>
@@ -6396,7 +6397,7 @@
           <a:p>
             <a:r>
               <a:rPr lang="en-GB" dirty="0"/>
-              <a:t>Rewards will encourage players to keep playing our game</a:t>
+              <a:t>Facebook integration </a:t>
             </a:r>
           </a:p>
           <a:p>
@@ -6405,7 +6406,7 @@
           <a:p>
             <a:r>
               <a:rPr lang="en-GB" dirty="0"/>
-              <a:t>Rewards will make players feel better about playing our game</a:t>
+              <a:t>See your friends rank and compete</a:t>
             </a:r>
           </a:p>
           <a:p>
@@ -6414,7 +6415,7 @@
           <a:p>
             <a:r>
               <a:rPr lang="en-GB" dirty="0"/>
-              <a:t>Getting rewards creates investment</a:t>
+              <a:t>Post what you have unlocked (zones, cosmetics)</a:t>
             </a:r>
           </a:p>
         </p:txBody>
@@ -6422,7 +6423,7 @@
     </p:spTree>
     <p:extLst>
       <p:ext uri="{BB962C8B-B14F-4D97-AF65-F5344CB8AC3E}">
-        <p14:creationId xmlns:p14="http://schemas.microsoft.com/office/powerpoint/2010/main" val="978697848"/>
+        <p14:creationId xmlns:p14="http://schemas.microsoft.com/office/powerpoint/2010/main" val="2259202206"/>
       </p:ext>
     </p:extLst>
   </p:cSld>
@@ -6466,7 +6467,7 @@
           <a:p>
             <a:r>
               <a:rPr lang="en-GB" dirty="0"/>
-              <a:t>How We Will Reward – New Sails</a:t>
+              <a:t>Rewards</a:t>
             </a:r>
           </a:p>
         </p:txBody>
@@ -6488,15 +6489,16 @@
           <a:p>
             <a:r>
               <a:rPr lang="en-GB" dirty="0"/>
-              <a:t>Fixed time reward – new random sail every 7</a:t>
-            </a:r>
-            <a:r>
-              <a:rPr lang="en-GB" baseline="30000" dirty="0"/>
-              <a:t>th</a:t>
-            </a:r>
+              <a:t>Rewards will encourage players to keep playing our game</a:t>
+            </a:r>
+          </a:p>
+          <a:p>
+            <a:endParaRPr lang="en-GB" dirty="0"/>
+          </a:p>
+          <a:p>
             <a:r>
               <a:rPr lang="en-GB" dirty="0"/>
-              <a:t> day you play the game</a:t>
+              <a:t>Rewards will make players feel better about playing our game</a:t>
             </a:r>
           </a:p>
           <a:p>
@@ -6505,41 +6507,7 @@
           <a:p>
             <a:r>
               <a:rPr lang="en-GB" dirty="0"/>
-              <a:t>Cosmetic item that allows customisation</a:t>
-            </a:r>
-          </a:p>
-          <a:p>
-            <a:endParaRPr lang="en-GB" dirty="0"/>
-          </a:p>
-          <a:p>
-            <a:r>
-              <a:rPr lang="en-GB" dirty="0"/>
-              <a:t>Creates daily habit of launching game (Hook model, </a:t>
-            </a:r>
-            <a:r>
-              <a:rPr lang="en-GB" dirty="0" err="1"/>
-              <a:t>Nir</a:t>
-            </a:r>
-            <a:r>
-              <a:rPr lang="en-GB" dirty="0"/>
-              <a:t> </a:t>
-            </a:r>
-            <a:r>
-              <a:rPr lang="en-GB" dirty="0" err="1"/>
-              <a:t>Eyal</a:t>
-            </a:r>
-            <a:r>
-              <a:rPr lang="en-GB" dirty="0"/>
-              <a:t>)</a:t>
-            </a:r>
-          </a:p>
-          <a:p>
-            <a:endParaRPr lang="en-GB" dirty="0"/>
-          </a:p>
-          <a:p>
-            <a:r>
-              <a:rPr lang="en-GB" dirty="0"/>
-              <a:t>Peacock effect – Look at me now </a:t>
+              <a:t>Getting rewards creates investment</a:t>
             </a:r>
           </a:p>
         </p:txBody>
@@ -6547,7 +6515,7 @@
     </p:spTree>
     <p:extLst>
       <p:ext uri="{BB962C8B-B14F-4D97-AF65-F5344CB8AC3E}">
-        <p14:creationId xmlns:p14="http://schemas.microsoft.com/office/powerpoint/2010/main" val="1855932502"/>
+        <p14:creationId xmlns:p14="http://schemas.microsoft.com/office/powerpoint/2010/main" val="1595183327"/>
       </p:ext>
     </p:extLst>
   </p:cSld>
@@ -6591,7 +6559,7 @@
           <a:p>
             <a:r>
               <a:rPr lang="en-GB" dirty="0"/>
-              <a:t>How We Will Reward - Chests</a:t>
+              <a:t>How We Will Reward – New Sails</a:t>
             </a:r>
           </a:p>
         </p:txBody>
@@ -6613,7 +6581,15 @@
           <a:p>
             <a:r>
               <a:rPr lang="en-GB" dirty="0"/>
-              <a:t>A chest will be awarded to a player for completing an exploration.</a:t>
+              <a:t>Fixed time reward – new random sail every 7</a:t>
+            </a:r>
+            <a:r>
+              <a:rPr lang="en-GB" baseline="30000" dirty="0"/>
+              <a:t>th</a:t>
+            </a:r>
+            <a:r>
+              <a:rPr lang="en-GB" dirty="0"/>
+              <a:t> day you play the game</a:t>
             </a:r>
           </a:p>
           <a:p>
@@ -6622,7 +6598,7 @@
           <a:p>
             <a:r>
               <a:rPr lang="en-GB" dirty="0"/>
-              <a:t>Chests contain variable rewards specific to that zone.</a:t>
+              <a:t>Cosmetic item that allows customisation</a:t>
             </a:r>
           </a:p>
           <a:p>
@@ -6631,7 +6607,32 @@
           <a:p>
             <a:r>
               <a:rPr lang="en-GB" dirty="0"/>
-              <a:t>Possible rewards from chests include: Unique sails, gold/resources, unique pets or whatever</a:t>
+              <a:t>Creates daily habit of launching game (Hook model, </a:t>
+            </a:r>
+            <a:r>
+              <a:rPr lang="en-GB" dirty="0" err="1"/>
+              <a:t>Nir</a:t>
+            </a:r>
+            <a:r>
+              <a:rPr lang="en-GB" dirty="0"/>
+              <a:t> </a:t>
+            </a:r>
+            <a:r>
+              <a:rPr lang="en-GB" dirty="0" err="1"/>
+              <a:t>Eyal</a:t>
+            </a:r>
+            <a:r>
+              <a:rPr lang="en-GB" dirty="0"/>
+              <a:t>)</a:t>
+            </a:r>
+          </a:p>
+          <a:p>
+            <a:endParaRPr lang="en-GB" dirty="0"/>
+          </a:p>
+          <a:p>
+            <a:r>
+              <a:rPr lang="en-GB" dirty="0"/>
+              <a:t>Peacock effect – Look at me now </a:t>
             </a:r>
           </a:p>
         </p:txBody>
@@ -6639,7 +6640,7 @@
     </p:spTree>
     <p:extLst>
       <p:ext uri="{BB962C8B-B14F-4D97-AF65-F5344CB8AC3E}">
-        <p14:creationId xmlns:p14="http://schemas.microsoft.com/office/powerpoint/2010/main" val="3165216436"/>
+        <p14:creationId xmlns:p14="http://schemas.microsoft.com/office/powerpoint/2010/main" val="698776812"/>
       </p:ext>
     </p:extLst>
   </p:cSld>
@@ -6683,7 +6684,7 @@
           <a:p>
             <a:r>
               <a:rPr lang="en-GB" dirty="0"/>
-              <a:t>How We Will Reward - Skill</a:t>
+              <a:t>How We Will Reward - Chests</a:t>
             </a:r>
           </a:p>
         </p:txBody>
@@ -6705,7 +6706,7 @@
           <a:p>
             <a:r>
               <a:rPr lang="en-GB" dirty="0"/>
-              <a:t>Skill reward - Bonus experience for playing well</a:t>
+              <a:t>A chest will be awarded to a player for completing an exploration.</a:t>
             </a:r>
           </a:p>
           <a:p>
@@ -6714,7 +6715,7 @@
           <a:p>
             <a:r>
               <a:rPr lang="en-GB" dirty="0"/>
-              <a:t>Why? - Increase feeling of mastery, makes player feel good</a:t>
+              <a:t>Chests contain variable rewards specific to that zone.</a:t>
             </a:r>
           </a:p>
           <a:p>
@@ -6723,16 +6724,15 @@
           <a:p>
             <a:r>
               <a:rPr lang="en-GB" dirty="0"/>
-              <a:t>Combos – E.g. tapping on birds in a row without missing one</a:t>
-            </a:r>
-          </a:p>
-          <a:p>
-            <a:endParaRPr lang="en-GB" dirty="0"/>
-          </a:p>
-          <a:p>
+              <a:t>Possible rewards from chests include: Unique sails, </a:t>
+            </a:r>
+            <a:r>
+              <a:rPr lang="en-GB"/>
+              <a:t>experience or unique </a:t>
+            </a:r>
             <a:r>
               <a:rPr lang="en-GB" dirty="0"/>
-              <a:t>Perfects – not making a single mistake. E.g. Not breaking the sails once on an exploration </a:t>
+              <a:t>pets</a:t>
             </a:r>
           </a:p>
         </p:txBody>
@@ -6740,7 +6740,7 @@
     </p:spTree>
     <p:extLst>
       <p:ext uri="{BB962C8B-B14F-4D97-AF65-F5344CB8AC3E}">
-        <p14:creationId xmlns:p14="http://schemas.microsoft.com/office/powerpoint/2010/main" val="3374794348"/>
+        <p14:creationId xmlns:p14="http://schemas.microsoft.com/office/powerpoint/2010/main" val="187908259"/>
       </p:ext>
     </p:extLst>
   </p:cSld>
@@ -6784,7 +6784,7 @@
           <a:p>
             <a:r>
               <a:rPr lang="en-GB" dirty="0"/>
-              <a:t>Immersion</a:t>
+              <a:t>How We Will Reward - Skill</a:t>
             </a:r>
           </a:p>
         </p:txBody>
@@ -6806,25 +6806,34 @@
           <a:p>
             <a:r>
               <a:rPr lang="en-GB" dirty="0"/>
-              <a:t>Tactical Immersion</a:t>
-            </a:r>
-          </a:p>
-          <a:p>
-            <a:pPr lvl="1"/>
+              <a:t>Skill reward - Bonus experience for playing well</a:t>
+            </a:r>
+          </a:p>
+          <a:p>
+            <a:endParaRPr lang="en-GB" dirty="0"/>
+          </a:p>
+          <a:p>
             <a:r>
               <a:rPr lang="en-GB" dirty="0"/>
-              <a:t>In game where the skill required to complete a level brings a player into the game</a:t>
-            </a:r>
-          </a:p>
-          <a:p>
-            <a:pPr lvl="1"/>
+              <a:t>Why? - Increase feeling of mastery, makes player feel good</a:t>
+            </a:r>
+          </a:p>
+          <a:p>
             <a:endParaRPr lang="en-GB" dirty="0"/>
           </a:p>
           <a:p>
-            <a:pPr lvl="1"/>
             <a:r>
               <a:rPr lang="en-GB" dirty="0"/>
-              <a:t>Could be phrased as “In the Zone”</a:t>
+              <a:t>Combos – E.g. tapping on birds in a row without missing one</a:t>
+            </a:r>
+          </a:p>
+          <a:p>
+            <a:endParaRPr lang="en-GB" dirty="0"/>
+          </a:p>
+          <a:p>
+            <a:r>
+              <a:rPr lang="en-GB" dirty="0"/>
+              <a:t>Perfects – not making a single mistake. E.g. Not breaking the sails once on an exploration </a:t>
             </a:r>
           </a:p>
         </p:txBody>
@@ -6832,7 +6841,7 @@
     </p:spTree>
     <p:extLst>
       <p:ext uri="{BB962C8B-B14F-4D97-AF65-F5344CB8AC3E}">
-        <p14:creationId xmlns:p14="http://schemas.microsoft.com/office/powerpoint/2010/main" val="1832220765"/>
+        <p14:creationId xmlns:p14="http://schemas.microsoft.com/office/powerpoint/2010/main" val="1508869047"/>
       </p:ext>
     </p:extLst>
   </p:cSld>
@@ -6866,6 +6875,98 @@
             <a:spLocks noGrp="1"/>
           </p:cNvSpPr>
           <p:nvPr>
+            <p:ph type="title"/>
+          </p:nvPr>
+        </p:nvSpPr>
+        <p:spPr/>
+        <p:txBody>
+          <a:bodyPr/>
+          <a:lstStyle/>
+          <a:p>
+            <a:r>
+              <a:rPr lang="en-GB" dirty="0"/>
+              <a:t>Immersion</a:t>
+            </a:r>
+          </a:p>
+        </p:txBody>
+      </p:sp>
+      <p:sp>
+        <p:nvSpPr>
+          <p:cNvPr id="3" name="Content Placeholder 2"/>
+          <p:cNvSpPr>
+            <a:spLocks noGrp="1"/>
+          </p:cNvSpPr>
+          <p:nvPr>
+            <p:ph idx="1"/>
+          </p:nvPr>
+        </p:nvSpPr>
+        <p:spPr/>
+        <p:txBody>
+          <a:bodyPr/>
+          <a:lstStyle/>
+          <a:p>
+            <a:r>
+              <a:rPr lang="en-GB" dirty="0"/>
+              <a:t>Tactical Immersion</a:t>
+            </a:r>
+          </a:p>
+          <a:p>
+            <a:pPr lvl="1"/>
+            <a:r>
+              <a:rPr lang="en-GB" dirty="0"/>
+              <a:t>In game where the skill required to complete a level brings a player into the game</a:t>
+            </a:r>
+          </a:p>
+          <a:p>
+            <a:pPr lvl="1"/>
+            <a:endParaRPr lang="en-GB" dirty="0"/>
+          </a:p>
+          <a:p>
+            <a:pPr lvl="1"/>
+            <a:r>
+              <a:rPr lang="en-GB" dirty="0"/>
+              <a:t>Could be phrased as “In the Zone”</a:t>
+            </a:r>
+          </a:p>
+        </p:txBody>
+      </p:sp>
+    </p:spTree>
+    <p:extLst>
+      <p:ext uri="{BB962C8B-B14F-4D97-AF65-F5344CB8AC3E}">
+        <p14:creationId xmlns:p14="http://schemas.microsoft.com/office/powerpoint/2010/main" val="2167117147"/>
+      </p:ext>
+    </p:extLst>
+  </p:cSld>
+  <p:clrMapOvr>
+    <a:masterClrMapping/>
+  </p:clrMapOvr>
+</p:sld>
+</file>
+
+<file path=ppt/slides/slide16.xml><?xml version="1.0" encoding="utf-8"?>
+<p:sld xmlns:a="http://schemas.openxmlformats.org/drawingml/2006/main" xmlns:r="http://schemas.openxmlformats.org/officeDocument/2006/relationships" xmlns:p="http://schemas.openxmlformats.org/presentationml/2006/main">
+  <p:cSld>
+    <p:spTree>
+      <p:nvGrpSpPr>
+        <p:cNvPr id="1" name=""/>
+        <p:cNvGrpSpPr/>
+        <p:nvPr/>
+      </p:nvGrpSpPr>
+      <p:grpSpPr>
+        <a:xfrm>
+          <a:off x="0" y="0"/>
+          <a:ext cx="0" cy="0"/>
+          <a:chOff x="0" y="0"/>
+          <a:chExt cx="0" cy="0"/>
+        </a:xfrm>
+      </p:grpSpPr>
+      <p:sp>
+        <p:nvSpPr>
+          <p:cNvPr id="2" name="Title 1"/>
+          <p:cNvSpPr>
+            <a:spLocks noGrp="1"/>
+          </p:cNvSpPr>
+          <p:nvPr>
             <p:ph type="ctrTitle"/>
           </p:nvPr>
         </p:nvSpPr>
@@ -6880,10 +6981,9 @@
           <a:lstStyle/>
           <a:p>
             <a:r>
-              <a:rPr lang="EN-US" dirty="0"/>
+              <a:rPr lang="en-US" dirty="0"/>
               <a:t>Tension and Release</a:t>
             </a:r>
-            <a:endParaRPr lang="en-US" dirty="0"/>
           </a:p>
         </p:txBody>
       </p:sp>
@@ -6910,10 +7010,9 @@
           <a:p>
             <a:pPr algn="ctr"/>
             <a:r>
-              <a:rPr lang="EN-US" u="sng" dirty="0"/>
+              <a:rPr lang="en-US" u="sng" dirty="0"/>
               <a:t>Tension through each level</a:t>
             </a:r>
-            <a:endParaRPr lang="en-US" u="sng" dirty="0"/>
           </a:p>
           <a:p>
             <a:pPr marL="285750" indent="-285750" algn="ctr">
@@ -6921,10 +7020,9 @@
               <a:buChar char="•"/>
             </a:pPr>
             <a:r>
-              <a:rPr lang="EN-US" dirty="0"/>
+              <a:rPr lang="en-US" dirty="0"/>
               <a:t>Increase overtime.</a:t>
             </a:r>
-            <a:endParaRPr lang="en-US" dirty="0"/>
           </a:p>
           <a:p>
             <a:pPr marL="285750" indent="-285750" algn="ctr">
@@ -6932,10 +7030,9 @@
               <a:buChar char="•"/>
             </a:pPr>
             <a:r>
-              <a:rPr lang="EN-US" dirty="0"/>
+              <a:rPr lang="en-US" dirty="0"/>
               <a:t>Keeping the player engaged.</a:t>
             </a:r>
-            <a:endParaRPr lang="en-US" dirty="0"/>
           </a:p>
           <a:p>
             <a:pPr marL="285750" indent="-285750" algn="ctr">
@@ -6943,10 +7040,9 @@
               <a:buChar char="•"/>
             </a:pPr>
             <a:r>
-              <a:rPr lang="EN-US" dirty="0"/>
+              <a:rPr lang="en-US" dirty="0"/>
               <a:t>Release once level is completed.</a:t>
             </a:r>
-            <a:endParaRPr lang="en-US" dirty="0"/>
           </a:p>
           <a:p>
             <a:pPr marL="285750" indent="-285750">
@@ -6967,7 +7063,7 @@
               <a:buFont typeface="Arial" panose="020B0604020202020204" pitchFamily="34" charset="0"/>
               <a:buChar char="•"/>
             </a:pPr>
-            <a:endParaRPr lang="EN-US" dirty="0"/>
+            <a:endParaRPr lang="en-US" dirty="0"/>
           </a:p>
         </p:txBody>
       </p:sp>
@@ -7138,10 +7234,9 @@
           <a:p>
             <a:pPr algn="ctr"/>
             <a:r>
-              <a:rPr lang="EN-US"/>
+              <a:rPr lang="en-US"/>
               <a:t>Time</a:t>
             </a:r>
-            <a:endParaRPr lang="en-US"/>
           </a:p>
         </p:txBody>
       </p:sp>
@@ -7168,10 +7263,9 @@
           <a:p>
             <a:pPr algn="ctr"/>
             <a:r>
-              <a:rPr lang="EN-US"/>
+              <a:rPr lang="en-US"/>
               <a:t>Tension</a:t>
             </a:r>
-            <a:endParaRPr lang="en-US"/>
           </a:p>
         </p:txBody>
       </p:sp>
@@ -7197,10 +7291,9 @@
           <a:lstStyle/>
           <a:p>
             <a:r>
-              <a:rPr lang="EN-US" u="sng" dirty="0"/>
+              <a:rPr lang="en-US" u="sng" dirty="0"/>
               <a:t>Release and Reward throughout the game</a:t>
             </a:r>
-            <a:endParaRPr lang="en-US" u="sng" dirty="0"/>
           </a:p>
           <a:p>
             <a:pPr marL="285750" indent="-285750" algn="ctr">
@@ -7208,10 +7301,9 @@
               <a:buChar char="•"/>
             </a:pPr>
             <a:r>
-              <a:rPr lang="EN-US" dirty="0"/>
+              <a:rPr lang="en-US" dirty="0"/>
               <a:t>Rewards come with release.</a:t>
             </a:r>
-            <a:endParaRPr lang="en-US" dirty="0"/>
           </a:p>
           <a:p>
             <a:pPr marL="285750" indent="-285750" algn="ctr">
@@ -7219,10 +7311,9 @@
               <a:buChar char="•"/>
             </a:pPr>
             <a:r>
-              <a:rPr lang="EN-US" dirty="0"/>
+              <a:rPr lang="en-US" dirty="0"/>
               <a:t>Reward player with help on mechanics and score.</a:t>
             </a:r>
-            <a:endParaRPr lang="en-US" dirty="0"/>
           </a:p>
           <a:p>
             <a:pPr marL="285750" indent="-285750" algn="ctr">
@@ -7230,7 +7321,7 @@
               <a:buChar char="•"/>
             </a:pPr>
             <a:r>
-              <a:rPr lang="EN-US" dirty="0"/>
+              <a:rPr lang="en-US" dirty="0"/>
               <a:t>Repeating difficulty curve to keep the game interesting but accessible to players of all skill levels.</a:t>
             </a:r>
           </a:p>
@@ -7267,7 +7358,7 @@
               <a:buFont typeface="Arial" panose="020B0604020202020204" pitchFamily="34" charset="0"/>
               <a:buChar char="•"/>
             </a:pPr>
-            <a:endParaRPr lang="EN-US" dirty="0"/>
+            <a:endParaRPr lang="en-US" dirty="0"/>
           </a:p>
         </p:txBody>
       </p:sp>
@@ -7330,10 +7421,9 @@
           <a:p>
             <a:pPr algn="ctr"/>
             <a:r>
-              <a:rPr lang="EN-US"/>
+              <a:rPr lang="en-US"/>
               <a:t>Levels</a:t>
             </a:r>
-            <a:endParaRPr lang="en-US"/>
           </a:p>
         </p:txBody>
       </p:sp>
@@ -7396,10 +7486,9 @@
           <a:p>
             <a:pPr algn="ctr"/>
             <a:r>
-              <a:rPr lang="EN-US"/>
+              <a:rPr lang="en-US"/>
               <a:t>Hard</a:t>
             </a:r>
-            <a:endParaRPr lang="en-US"/>
           </a:p>
         </p:txBody>
       </p:sp>
@@ -7426,10 +7515,9 @@
           <a:p>
             <a:pPr algn="ctr"/>
             <a:r>
-              <a:rPr lang="EN-US"/>
+              <a:rPr lang="en-US"/>
               <a:t>Easy</a:t>
             </a:r>
-            <a:endParaRPr lang="en-US"/>
           </a:p>
         </p:txBody>
       </p:sp>
@@ -7706,10 +7794,9 @@
           <a:p>
             <a:pPr algn="ctr"/>
             <a:r>
-              <a:rPr lang="EN-US" dirty="0"/>
+              <a:rPr lang="en-US" dirty="0"/>
               <a:t>New mechanic</a:t>
             </a:r>
-            <a:endParaRPr lang="en-US" dirty="0"/>
           </a:p>
         </p:txBody>
       </p:sp>
@@ -7784,7 +7871,7 @@
     </p:spTree>
     <p:extLst>
       <p:ext uri="{BB962C8B-B14F-4D97-AF65-F5344CB8AC3E}">
-        <p14:creationId xmlns:p14="http://schemas.microsoft.com/office/powerpoint/2010/main" val="1219385992"/>
+        <p14:creationId xmlns:p14="http://schemas.microsoft.com/office/powerpoint/2010/main" val="2760608251"/>
       </p:ext>
     </p:extLst>
   </p:cSld>
@@ -7794,7 +7881,7 @@
 </p:sld>
 </file>
 
-<file path=ppt/slides/slide16.xml><?xml version="1.0" encoding="utf-8"?>
+<file path=ppt/slides/slide17.xml><?xml version="1.0" encoding="utf-8"?>
 <p:sld xmlns:a="http://schemas.openxmlformats.org/drawingml/2006/main" xmlns:r="http://schemas.openxmlformats.org/officeDocument/2006/relationships" xmlns:p="http://schemas.openxmlformats.org/presentationml/2006/main">
   <p:cSld>
     <p:spTree>
@@ -7885,7 +7972,7 @@
     </p:spTree>
     <p:extLst>
       <p:ext uri="{BB962C8B-B14F-4D97-AF65-F5344CB8AC3E}">
-        <p14:creationId xmlns:p14="http://schemas.microsoft.com/office/powerpoint/2010/main" val="4223840035"/>
+        <p14:creationId xmlns:p14="http://schemas.microsoft.com/office/powerpoint/2010/main" val="3811817016"/>
       </p:ext>
     </p:extLst>
   </p:cSld>
@@ -7895,7 +7982,7 @@
 </p:sld>
 </file>
 
-<file path=ppt/slides/slide17.xml><?xml version="1.0" encoding="utf-8"?>
+<file path=ppt/slides/slide18.xml><?xml version="1.0" encoding="utf-8"?>
 <p:sld xmlns:a="http://schemas.openxmlformats.org/drawingml/2006/main" xmlns:r="http://schemas.openxmlformats.org/officeDocument/2006/relationships" xmlns:p="http://schemas.openxmlformats.org/presentationml/2006/main">
   <p:cSld>
     <p:spTree>
@@ -7950,7 +8037,7 @@
           <p:nvPr/>
         </p:nvPicPr>
         <p:blipFill rotWithShape="1">
-          <a:blip r:embed="rId3">
+          <a:blip r:embed="rId3" cstate="print">
             <a:extLst>
               <a:ext uri="{28A0092B-C50C-407E-A947-70E740481C1C}">
                 <a14:useLocalDpi xmlns:a14="http://schemas.microsoft.com/office/drawing/2010/main" val="0"/>
@@ -8110,7 +8197,7 @@
     </p:spTree>
     <p:extLst>
       <p:ext uri="{BB962C8B-B14F-4D97-AF65-F5344CB8AC3E}">
-        <p14:creationId xmlns:p14="http://schemas.microsoft.com/office/powerpoint/2010/main" val="1978924814"/>
+        <p14:creationId xmlns:p14="http://schemas.microsoft.com/office/powerpoint/2010/main" val="3560394862"/>
       </p:ext>
     </p:extLst>
   </p:cSld>
@@ -8120,7 +8207,7 @@
 </p:sld>
 </file>
 
-<file path=ppt/slides/slide18.xml><?xml version="1.0" encoding="utf-8"?>
+<file path=ppt/slides/slide19.xml><?xml version="1.0" encoding="utf-8"?>
 <p:sld xmlns:a="http://schemas.openxmlformats.org/drawingml/2006/main" xmlns:r="http://schemas.openxmlformats.org/officeDocument/2006/relationships" xmlns:p="http://schemas.openxmlformats.org/presentationml/2006/main">
   <p:cSld>
     <p:spTree>
@@ -8169,7 +8256,7 @@
     </p:spTree>
     <p:extLst>
       <p:ext uri="{BB962C8B-B14F-4D97-AF65-F5344CB8AC3E}">
-        <p14:creationId xmlns:p14="http://schemas.microsoft.com/office/powerpoint/2010/main" val="875527399"/>
+        <p14:creationId xmlns:p14="http://schemas.microsoft.com/office/powerpoint/2010/main" val="3503293579"/>
       </p:ext>
     </p:extLst>
   </p:cSld>
@@ -8233,7 +8320,21 @@
           <a:p>
             <a:r>
               <a:rPr lang="en-GB" dirty="0"/>
-              <a:t>Demographic- 18-24 Males</a:t>
+              <a:t>Demographic - 18-24 Males, Mobile Users</a:t>
+            </a:r>
+          </a:p>
+          <a:p>
+            <a:pPr lvl="1"/>
+            <a:r>
+              <a:rPr lang="en-GB" dirty="0"/>
+              <a:t>Focus on skill and mastery</a:t>
+            </a:r>
+          </a:p>
+          <a:p>
+            <a:pPr lvl="1"/>
+            <a:r>
+              <a:rPr lang="en-GB" dirty="0"/>
+              <a:t>Males tend to enjoy competition </a:t>
             </a:r>
           </a:p>
           <a:p>
@@ -8243,12 +8344,18 @@
             <a:endParaRPr lang="en-GB" dirty="0"/>
           </a:p>
           <a:p>
-            <a:endParaRPr lang="en-GB" dirty="0"/>
-          </a:p>
-          <a:p>
             <a:r>
               <a:rPr lang="en-GB" dirty="0"/>
-              <a:t>Goal-</a:t>
+              <a:t>Goal- Compete against your friends, complete all zones and reach the highest rank. </a:t>
+            </a:r>
+          </a:p>
+          <a:p>
+            <a:pPr marL="0" indent="0">
+              <a:buNone/>
+            </a:pPr>
+            <a:r>
+              <a:rPr lang="en-GB" dirty="0"/>
+              <a:t>		Unlock cool loot as you go!</a:t>
             </a:r>
           </a:p>
         </p:txBody>
@@ -8256,7 +8363,7 @@
     </p:spTree>
     <p:extLst>
       <p:ext uri="{BB962C8B-B14F-4D97-AF65-F5344CB8AC3E}">
-        <p14:creationId xmlns:p14="http://schemas.microsoft.com/office/powerpoint/2010/main" val="657506836"/>
+        <p14:creationId xmlns:p14="http://schemas.microsoft.com/office/powerpoint/2010/main" val="3496660996"/>
       </p:ext>
     </p:extLst>
   </p:cSld>
@@ -8329,33 +8436,44 @@
           <a:p>
             <a:r>
               <a:rPr lang="en-GB" dirty="0"/>
-              <a:t>Hard Fun</a:t>
+              <a:t>Player Experience</a:t>
             </a:r>
           </a:p>
           <a:p>
             <a:pPr lvl="1"/>
             <a:r>
               <a:rPr lang="en-GB" dirty="0"/>
-              <a:t>Links into Fierro</a:t>
+              <a:t>Curiosity – Future mechanics</a:t>
             </a:r>
           </a:p>
           <a:p>
             <a:pPr lvl="1"/>
             <a:r>
               <a:rPr lang="en-GB" dirty="0"/>
-              <a:t>Player </a:t>
+              <a:t>Stress – Failing to complete levels</a:t>
+            </a:r>
+          </a:p>
+          <a:p>
+            <a:pPr lvl="1"/>
+            <a:r>
+              <a:rPr lang="en-GB" dirty="0"/>
+              <a:t>Fiero – Completion of levels</a:t>
+            </a:r>
+          </a:p>
+          <a:p>
+            <a:pPr lvl="1"/>
+            <a:r>
+              <a:rPr lang="en-GB" dirty="0"/>
+              <a:t>Hard fun</a:t>
             </a:r>
           </a:p>
           <a:p>
             <a:pPr marL="0" indent="0">
               <a:buNone/>
             </a:pPr>
-            <a:endParaRPr lang="en-GB" dirty="0"/>
-          </a:p>
-          <a:p>
             <a:r>
               <a:rPr lang="en-GB" dirty="0"/>
-              <a:t>Player Experience</a:t>
+              <a:t>	</a:t>
             </a:r>
           </a:p>
           <a:p>
@@ -8377,7 +8495,7 @@
     </p:spTree>
     <p:extLst>
       <p:ext uri="{BB962C8B-B14F-4D97-AF65-F5344CB8AC3E}">
-        <p14:creationId xmlns:p14="http://schemas.microsoft.com/office/powerpoint/2010/main" val="1866350555"/>
+        <p14:creationId xmlns:p14="http://schemas.microsoft.com/office/powerpoint/2010/main" val="1159452675"/>
       </p:ext>
     </p:extLst>
   </p:cSld>
@@ -8421,7 +8539,7 @@
           <a:p>
             <a:r>
               <a:rPr lang="en-GB" dirty="0"/>
-              <a:t>Mechanics - Sails</a:t>
+              <a:t>Mechanics – Boat Switching</a:t>
             </a:r>
           </a:p>
         </p:txBody>
@@ -8440,6 +8558,9 @@
         <p:txBody>
           <a:bodyPr/>
           <a:lstStyle/>
+          <a:p>
+            <a:endParaRPr lang="en-GB" dirty="0"/>
+          </a:p>
           <a:p>
             <a:endParaRPr lang="en-GB" dirty="0"/>
           </a:p>
@@ -8448,7 +8569,7 @@
     </p:spTree>
     <p:extLst>
       <p:ext uri="{BB962C8B-B14F-4D97-AF65-F5344CB8AC3E}">
-        <p14:creationId xmlns:p14="http://schemas.microsoft.com/office/powerpoint/2010/main" val="3817882482"/>
+        <p14:creationId xmlns:p14="http://schemas.microsoft.com/office/powerpoint/2010/main" val="568667032"/>
       </p:ext>
     </p:extLst>
   </p:cSld>
@@ -8492,7 +8613,7 @@
           <a:p>
             <a:r>
               <a:rPr lang="en-GB" dirty="0"/>
-              <a:t>Mechanics – Birds</a:t>
+              <a:t>Mechanics - Sails</a:t>
             </a:r>
           </a:p>
         </p:txBody>
@@ -8511,6 +8632,12 @@
         <p:txBody>
           <a:bodyPr/>
           <a:lstStyle/>
+          <a:p>
+            <a:pPr marL="0" indent="0">
+              <a:buNone/>
+            </a:pPr>
+            <a:endParaRPr lang="en-GB" dirty="0"/>
+          </a:p>
           <a:p>
             <a:endParaRPr lang="en-GB" dirty="0"/>
           </a:p>
@@ -8519,7 +8646,7 @@
     </p:spTree>
     <p:extLst>
       <p:ext uri="{BB962C8B-B14F-4D97-AF65-F5344CB8AC3E}">
-        <p14:creationId xmlns:p14="http://schemas.microsoft.com/office/powerpoint/2010/main" val="1886669089"/>
+        <p14:creationId xmlns:p14="http://schemas.microsoft.com/office/powerpoint/2010/main" val="483789490"/>
       </p:ext>
     </p:extLst>
   </p:cSld>
@@ -8563,7 +8690,7 @@
           <a:p>
             <a:r>
               <a:rPr lang="en-GB" dirty="0"/>
-              <a:t>Mechanics – Fire</a:t>
+              <a:t>Mechanics – Birds</a:t>
             </a:r>
           </a:p>
         </p:txBody>
@@ -8583,14 +8710,14 @@
           <a:bodyPr/>
           <a:lstStyle/>
           <a:p>
-            <a:endParaRPr lang="en-GB" dirty="0"/>
+            <a:endParaRPr lang="en-GB"/>
           </a:p>
         </p:txBody>
       </p:sp>
     </p:spTree>
     <p:extLst>
       <p:ext uri="{BB962C8B-B14F-4D97-AF65-F5344CB8AC3E}">
-        <p14:creationId xmlns:p14="http://schemas.microsoft.com/office/powerpoint/2010/main" val="2890548306"/>
+        <p14:creationId xmlns:p14="http://schemas.microsoft.com/office/powerpoint/2010/main" val="550952986"/>
       </p:ext>
     </p:extLst>
   </p:cSld>
@@ -8634,7 +8761,7 @@
           <a:p>
             <a:r>
               <a:rPr lang="en-GB" dirty="0"/>
-              <a:t>Mechanics – Kraken!</a:t>
+              <a:t>Mechanics – Fire</a:t>
             </a:r>
           </a:p>
         </p:txBody>
@@ -8654,14 +8781,14 @@
           <a:bodyPr/>
           <a:lstStyle/>
           <a:p>
-            <a:endParaRPr lang="en-GB" dirty="0"/>
+            <a:endParaRPr lang="en-GB"/>
           </a:p>
         </p:txBody>
       </p:sp>
     </p:spTree>
     <p:extLst>
       <p:ext uri="{BB962C8B-B14F-4D97-AF65-F5344CB8AC3E}">
-        <p14:creationId xmlns:p14="http://schemas.microsoft.com/office/powerpoint/2010/main" val="1669615263"/>
+        <p14:creationId xmlns:p14="http://schemas.microsoft.com/office/powerpoint/2010/main" val="24996538"/>
       </p:ext>
     </p:extLst>
   </p:cSld>
@@ -8705,7 +8832,7 @@
           <a:p>
             <a:r>
               <a:rPr lang="en-GB" dirty="0"/>
-              <a:t>Progression System</a:t>
+              <a:t>Mechanics – Kraken!</a:t>
             </a:r>
           </a:p>
         </p:txBody>
@@ -8725,44 +8852,14 @@
           <a:bodyPr/>
           <a:lstStyle/>
           <a:p>
-            <a:r>
-              <a:rPr lang="en-GB" dirty="0"/>
-              <a:t>Players progress through the game by exploring zones</a:t>
-            </a:r>
-          </a:p>
-          <a:p>
-            <a:endParaRPr lang="en-GB" dirty="0"/>
-          </a:p>
-          <a:p>
-            <a:r>
-              <a:rPr lang="en-GB" dirty="0"/>
-              <a:t>Zones will get tougher and require stronger/more ships</a:t>
-            </a:r>
-          </a:p>
-          <a:p>
-            <a:endParaRPr lang="en-GB" dirty="0"/>
-          </a:p>
-          <a:p>
-            <a:r>
-              <a:rPr lang="en-GB" dirty="0"/>
-              <a:t>Completing an exploration rewards the player with experience</a:t>
-            </a:r>
-          </a:p>
-          <a:p>
-            <a:endParaRPr lang="en-GB" dirty="0"/>
-          </a:p>
-          <a:p>
-            <a:r>
-              <a:rPr lang="en-GB" dirty="0"/>
-              <a:t>This experience will increase their Rank</a:t>
-            </a:r>
+            <a:endParaRPr lang="en-GB"/>
           </a:p>
         </p:txBody>
       </p:sp>
     </p:spTree>
     <p:extLst>
       <p:ext uri="{BB962C8B-B14F-4D97-AF65-F5344CB8AC3E}">
-        <p14:creationId xmlns:p14="http://schemas.microsoft.com/office/powerpoint/2010/main" val="2471499059"/>
+        <p14:creationId xmlns:p14="http://schemas.microsoft.com/office/powerpoint/2010/main" val="3503197959"/>
       </p:ext>
     </p:extLst>
   </p:cSld>
@@ -8806,7 +8903,7 @@
           <a:p>
             <a:r>
               <a:rPr lang="en-GB" dirty="0"/>
-              <a:t>Social Competition</a:t>
+              <a:t>Progression System</a:t>
             </a:r>
           </a:p>
         </p:txBody>
@@ -8828,7 +8925,7 @@
           <a:p>
             <a:r>
               <a:rPr lang="en-GB" dirty="0"/>
-              <a:t>Facebook integration </a:t>
+              <a:t>Players progress through the game by exploring zones</a:t>
             </a:r>
           </a:p>
           <a:p>
@@ -8837,7 +8934,7 @@
           <a:p>
             <a:r>
               <a:rPr lang="en-GB" dirty="0"/>
-              <a:t>See your friends rank and compete</a:t>
+              <a:t>Zones will get tougher and require higher ranks</a:t>
             </a:r>
           </a:p>
           <a:p>
@@ -8846,7 +8943,16 @@
           <a:p>
             <a:r>
               <a:rPr lang="en-GB" dirty="0"/>
-              <a:t>Post what you have unlocked (zones, cosmetics)</a:t>
+              <a:t>Completing an exploration rewards the player with experience</a:t>
+            </a:r>
+          </a:p>
+          <a:p>
+            <a:endParaRPr lang="en-GB" dirty="0"/>
+          </a:p>
+          <a:p>
+            <a:r>
+              <a:rPr lang="en-GB" dirty="0"/>
+              <a:t>This experience will increase their Rank</a:t>
             </a:r>
           </a:p>
         </p:txBody>
@@ -8854,7 +8960,7 @@
     </p:spTree>
     <p:extLst>
       <p:ext uri="{BB962C8B-B14F-4D97-AF65-F5344CB8AC3E}">
-        <p14:creationId xmlns:p14="http://schemas.microsoft.com/office/powerpoint/2010/main" val="824628681"/>
+        <p14:creationId xmlns:p14="http://schemas.microsoft.com/office/powerpoint/2010/main" val="3024992751"/>
       </p:ext>
     </p:extLst>
   </p:cSld>

</xml_diff>